<commit_message>
Created Week 2 Powerpoint and added materials
</commit_message>
<xml_diff>
--- a/Presentations/Week_1_Introduction/BCS Stats Week 1 INTRO.pptx
+++ b/Presentations/Week_1_Introduction/BCS Stats Week 1 INTRO.pptx
@@ -5915,7 +5915,26 @@
           <a:bodyPr/>
           <a:lstStyle/>
           <a:p>
-            <a:endParaRPr lang="en-US"/>
+            <a:r>
+              <a:rPr lang="en-US" dirty="0">
+                <a:hlinkClick r:id="rId2"/>
+              </a:rPr>
+              <a:t>https://b.socrative.com/login/student</a:t>
+            </a:r>
+            <a:r>
+              <a:rPr lang="en-US" dirty="0" smtClean="0">
+                <a:hlinkClick r:id="rId2"/>
+              </a:rPr>
+              <a:t>/</a:t>
+            </a:r>
+            <a:endParaRPr lang="en-US" dirty="0" smtClean="0"/>
+          </a:p>
+          <a:p>
+            <a:r>
+              <a:rPr lang="en-US" dirty="0" smtClean="0"/>
+              <a:t>Room Name: BCSSTATS2020</a:t>
+            </a:r>
+            <a:endParaRPr lang="en-US" dirty="0"/>
           </a:p>
         </p:txBody>
       </p:sp>
@@ -6018,18 +6037,58 @@
             </a:r>
           </a:p>
           <a:p>
+            <a:pPr lvl="1"/>
+            <a:r>
+              <a:rPr lang="en-US" dirty="0" smtClean="0"/>
+              <a:t>Read:</a:t>
+            </a:r>
+          </a:p>
+          <a:p>
             <a:pPr lvl="2"/>
             <a:r>
-              <a:rPr lang="en-US" dirty="0"/>
-              <a:t>Read:</a:t>
+              <a:rPr lang="en-US" dirty="0" smtClean="0"/>
+              <a:t>2 PDFs in </a:t>
+            </a:r>
+            <a:r>
+              <a:rPr lang="en-US" b="1" i="1" dirty="0" smtClean="0"/>
+              <a:t>“BCS519_stats\Presentations\Week_2_Foundations”</a:t>
             </a:r>
           </a:p>
           <a:p>
             <a:pPr lvl="2"/>
             <a:r>
-              <a:rPr lang="en-US" dirty="0"/>
-              <a:t>Do exercises:</a:t>
-            </a:r>
+              <a:rPr lang="en-US" dirty="0">
+                <a:hlinkClick r:id="rId2"/>
+              </a:rPr>
+              <a:t>https://bookdown.org/egarpor/PM-UC3M/intro-what-is.html</a:t>
+            </a:r>
+            <a:endParaRPr lang="en-US" b="1" i="1" dirty="0" smtClean="0"/>
+          </a:p>
+          <a:p>
+            <a:pPr lvl="2"/>
+            <a:r>
+              <a:rPr lang="en-US" dirty="0">
+                <a:hlinkClick r:id="rId3"/>
+              </a:rPr>
+              <a:t>https://bookdown.org/egarpor/PM-UC3M/lm-i-assumps.html</a:t>
+            </a:r>
+            <a:endParaRPr lang="en-US" dirty="0"/>
+          </a:p>
+          <a:p>
+            <a:pPr lvl="1"/>
+            <a:r>
+              <a:rPr lang="en-US" dirty="0" smtClean="0"/>
+              <a:t>Do exercises described </a:t>
+            </a:r>
+            <a:r>
+              <a:rPr lang="en-US" dirty="0"/>
+              <a:t>in </a:t>
+            </a:r>
+            <a:r>
+              <a:rPr lang="en-US" b="1" i="1" dirty="0" smtClean="0"/>
+              <a:t>“BCS519_stats\Homework\HWDueWeek2”</a:t>
+            </a:r>
+            <a:endParaRPr lang="en-US" b="1" i="1" dirty="0"/>
           </a:p>
           <a:p>
             <a:pPr marL="914400" lvl="2" indent="0">
@@ -6058,11 +6117,7 @@
             </a:r>
             <a:r>
               <a:rPr lang="en-US" dirty="0" smtClean="0"/>
-              <a:t> working on </a:t>
-            </a:r>
-            <a:r>
-              <a:rPr lang="en-US" smtClean="0"/>
-              <a:t>your machine.</a:t>
+              <a:t> working on your machine.</a:t>
             </a:r>
             <a:endParaRPr lang="en-US" dirty="0"/>
           </a:p>
@@ -6480,45 +6535,85 @@
               <a:buNone/>
             </a:pPr>
             <a:r>
-              <a:rPr lang="en-US" sz="2000" i="1"/>
+              <a:rPr lang="en-US" sz="2000" i="1" dirty="0"/>
               <a:t>BCS statistics course centered around learning statistical techniques that can help in analyzing and understanding data. </a:t>
             </a:r>
-            <a:endParaRPr lang="en-US" sz="2000"/>
-          </a:p>
-          <a:p>
-            <a:endParaRPr lang="en-US" sz="2000"/>
-          </a:p>
-          <a:p>
-            <a:r>
-              <a:rPr lang="en-US" sz="2000"/>
+            <a:endParaRPr lang="en-US" sz="2000" dirty="0"/>
+          </a:p>
+          <a:p>
+            <a:endParaRPr lang="en-US" sz="2000" dirty="0"/>
+          </a:p>
+          <a:p>
+            <a:r>
+              <a:rPr lang="en-US" sz="2000" dirty="0"/>
               <a:t>Meets </a:t>
             </a:r>
             <a:r>
-              <a:rPr lang="en-US" sz="2000" b="1"/>
+              <a:rPr lang="en-US" sz="2000" b="1" dirty="0"/>
               <a:t>Thursdays 1:00-3:30PM</a:t>
             </a:r>
             <a:r>
-              <a:rPr lang="en-US" sz="2000"/>
+              <a:rPr lang="en-US" sz="2000" dirty="0" smtClean="0"/>
               <a:t>.</a:t>
-            </a:r>
-          </a:p>
-          <a:p>
-            <a:r>
-              <a:rPr lang="en-US" sz="2000"/>
-              <a:t>Fulfill stats requirement.</a:t>
-            </a:r>
-          </a:p>
-          <a:p>
-            <a:r>
-              <a:rPr lang="en-US" sz="2000"/>
-              <a:t>We will use MatLab as the main language.</a:t>
             </a:r>
           </a:p>
           <a:p>
             <a:pPr marL="0" indent="0">
               <a:buNone/>
             </a:pPr>
-            <a:endParaRPr lang="en-US" sz="2000"/>
+            <a:endParaRPr lang="en-US" sz="2000" dirty="0"/>
+          </a:p>
+          <a:p>
+            <a:r>
+              <a:rPr lang="en-US" sz="2000" dirty="0"/>
+              <a:t>Fulfill stats requirement</a:t>
+            </a:r>
+            <a:r>
+              <a:rPr lang="en-US" sz="2000" dirty="0" smtClean="0"/>
+              <a:t>.</a:t>
+            </a:r>
+          </a:p>
+          <a:p>
+            <a:pPr lvl="1"/>
+            <a:r>
+              <a:rPr lang="en-US" sz="1800" dirty="0" smtClean="0"/>
+              <a:t>Grading is based on undergrad/graduate.</a:t>
+            </a:r>
+          </a:p>
+          <a:p>
+            <a:pPr marL="457200" lvl="1" indent="0">
+              <a:buNone/>
+            </a:pPr>
+            <a:endParaRPr lang="en-US" sz="1800" dirty="0"/>
+          </a:p>
+          <a:p>
+            <a:r>
+              <a:rPr lang="en-US" sz="2000" dirty="0"/>
+              <a:t>We will use </a:t>
+            </a:r>
+            <a:r>
+              <a:rPr lang="en-US" sz="2000" dirty="0" err="1"/>
+              <a:t>MatLab</a:t>
+            </a:r>
+            <a:r>
+              <a:rPr lang="en-US" sz="2000" dirty="0"/>
+              <a:t> as the main language</a:t>
+            </a:r>
+            <a:r>
+              <a:rPr lang="en-US" sz="2000" dirty="0" smtClean="0"/>
+              <a:t>. </a:t>
+            </a:r>
+            <a:r>
+              <a:rPr lang="en-US" sz="2000" dirty="0" smtClean="0"/>
+              <a:t>(maybe a little R)</a:t>
+            </a:r>
+            <a:endParaRPr lang="en-US" sz="2000" dirty="0"/>
+          </a:p>
+          <a:p>
+            <a:pPr marL="0" indent="0">
+              <a:buNone/>
+            </a:pPr>
+            <a:endParaRPr lang="en-US" sz="2000" dirty="0"/>
           </a:p>
         </p:txBody>
       </p:sp>
@@ -6535,7 +6630,208 @@
   <p:timing>
     <p:tnLst>
       <p:par>
-        <p:cTn id="1" dur="indefinite" restart="never" nodeType="tmRoot"/>
+        <p:cTn id="1" dur="indefinite" restart="never" nodeType="tmRoot">
+          <p:childTnLst>
+            <p:seq concurrent="1" nextAc="seek">
+              <p:cTn id="2" dur="indefinite" nodeType="mainSeq">
+                <p:childTnLst>
+                  <p:par>
+                    <p:cTn id="3" fill="hold">
+                      <p:stCondLst>
+                        <p:cond delay="indefinite"/>
+                      </p:stCondLst>
+                      <p:childTnLst>
+                        <p:par>
+                          <p:cTn id="4" fill="hold">
+                            <p:stCondLst>
+                              <p:cond delay="0"/>
+                            </p:stCondLst>
+                            <p:childTnLst>
+                              <p:par>
+                                <p:cTn id="5" presetID="1" presetClass="entr" presetSubtype="0" fill="hold" nodeType="clickEffect">
+                                  <p:stCondLst>
+                                    <p:cond delay="0"/>
+                                  </p:stCondLst>
+                                  <p:childTnLst>
+                                    <p:set>
+                                      <p:cBhvr>
+                                        <p:cTn id="6" dur="1" fill="hold">
+                                          <p:stCondLst>
+                                            <p:cond delay="0"/>
+                                          </p:stCondLst>
+                                        </p:cTn>
+                                        <p:tgtEl>
+                                          <p:spTgt spid="3">
+                                            <p:txEl>
+                                              <p:pRg st="2" end="2"/>
+                                            </p:txEl>
+                                          </p:spTgt>
+                                        </p:tgtEl>
+                                        <p:attrNameLst>
+                                          <p:attrName>style.visibility</p:attrName>
+                                        </p:attrNameLst>
+                                      </p:cBhvr>
+                                      <p:to>
+                                        <p:strVal val="visible"/>
+                                      </p:to>
+                                    </p:set>
+                                  </p:childTnLst>
+                                </p:cTn>
+                              </p:par>
+                            </p:childTnLst>
+                          </p:cTn>
+                        </p:par>
+                      </p:childTnLst>
+                    </p:cTn>
+                  </p:par>
+                  <p:par>
+                    <p:cTn id="7" fill="hold">
+                      <p:stCondLst>
+                        <p:cond delay="indefinite"/>
+                      </p:stCondLst>
+                      <p:childTnLst>
+                        <p:par>
+                          <p:cTn id="8" fill="hold">
+                            <p:stCondLst>
+                              <p:cond delay="0"/>
+                            </p:stCondLst>
+                            <p:childTnLst>
+                              <p:par>
+                                <p:cTn id="9" presetID="1" presetClass="entr" presetSubtype="0" fill="hold" nodeType="clickEffect">
+                                  <p:stCondLst>
+                                    <p:cond delay="0"/>
+                                  </p:stCondLst>
+                                  <p:childTnLst>
+                                    <p:set>
+                                      <p:cBhvr>
+                                        <p:cTn id="10" dur="1" fill="hold">
+                                          <p:stCondLst>
+                                            <p:cond delay="0"/>
+                                          </p:stCondLst>
+                                        </p:cTn>
+                                        <p:tgtEl>
+                                          <p:spTgt spid="3">
+                                            <p:txEl>
+                                              <p:pRg st="4" end="4"/>
+                                            </p:txEl>
+                                          </p:spTgt>
+                                        </p:tgtEl>
+                                        <p:attrNameLst>
+                                          <p:attrName>style.visibility</p:attrName>
+                                        </p:attrNameLst>
+                                      </p:cBhvr>
+                                      <p:to>
+                                        <p:strVal val="visible"/>
+                                      </p:to>
+                                    </p:set>
+                                  </p:childTnLst>
+                                </p:cTn>
+                              </p:par>
+                              <p:par>
+                                <p:cTn id="11" presetID="1" presetClass="entr" presetSubtype="0" fill="hold" nodeType="withEffect">
+                                  <p:stCondLst>
+                                    <p:cond delay="0"/>
+                                  </p:stCondLst>
+                                  <p:childTnLst>
+                                    <p:set>
+                                      <p:cBhvr>
+                                        <p:cTn id="12" dur="1" fill="hold">
+                                          <p:stCondLst>
+                                            <p:cond delay="0"/>
+                                          </p:stCondLst>
+                                        </p:cTn>
+                                        <p:tgtEl>
+                                          <p:spTgt spid="3">
+                                            <p:txEl>
+                                              <p:pRg st="5" end="5"/>
+                                            </p:txEl>
+                                          </p:spTgt>
+                                        </p:tgtEl>
+                                        <p:attrNameLst>
+                                          <p:attrName>style.visibility</p:attrName>
+                                        </p:attrNameLst>
+                                      </p:cBhvr>
+                                      <p:to>
+                                        <p:strVal val="visible"/>
+                                      </p:to>
+                                    </p:set>
+                                  </p:childTnLst>
+                                </p:cTn>
+                              </p:par>
+                            </p:childTnLst>
+                          </p:cTn>
+                        </p:par>
+                      </p:childTnLst>
+                    </p:cTn>
+                  </p:par>
+                  <p:par>
+                    <p:cTn id="13" fill="hold">
+                      <p:stCondLst>
+                        <p:cond delay="indefinite"/>
+                      </p:stCondLst>
+                      <p:childTnLst>
+                        <p:par>
+                          <p:cTn id="14" fill="hold">
+                            <p:stCondLst>
+                              <p:cond delay="0"/>
+                            </p:stCondLst>
+                            <p:childTnLst>
+                              <p:par>
+                                <p:cTn id="15" presetID="1" presetClass="entr" presetSubtype="0" fill="hold" nodeType="clickEffect">
+                                  <p:stCondLst>
+                                    <p:cond delay="0"/>
+                                  </p:stCondLst>
+                                  <p:childTnLst>
+                                    <p:set>
+                                      <p:cBhvr>
+                                        <p:cTn id="16" dur="1" fill="hold">
+                                          <p:stCondLst>
+                                            <p:cond delay="0"/>
+                                          </p:stCondLst>
+                                        </p:cTn>
+                                        <p:tgtEl>
+                                          <p:spTgt spid="3">
+                                            <p:txEl>
+                                              <p:pRg st="7" end="7"/>
+                                            </p:txEl>
+                                          </p:spTgt>
+                                        </p:tgtEl>
+                                        <p:attrNameLst>
+                                          <p:attrName>style.visibility</p:attrName>
+                                        </p:attrNameLst>
+                                      </p:cBhvr>
+                                      <p:to>
+                                        <p:strVal val="visible"/>
+                                      </p:to>
+                                    </p:set>
+                                  </p:childTnLst>
+                                </p:cTn>
+                              </p:par>
+                            </p:childTnLst>
+                          </p:cTn>
+                        </p:par>
+                      </p:childTnLst>
+                    </p:cTn>
+                  </p:par>
+                </p:childTnLst>
+              </p:cTn>
+              <p:prevCondLst>
+                <p:cond evt="onPrev" delay="0">
+                  <p:tgtEl>
+                    <p:sldTgt/>
+                  </p:tgtEl>
+                </p:cond>
+              </p:prevCondLst>
+              <p:nextCondLst>
+                <p:cond evt="onNext" delay="0">
+                  <p:tgtEl>
+                    <p:sldTgt/>
+                  </p:tgtEl>
+                </p:cond>
+              </p:nextCondLst>
+            </p:seq>
+          </p:childTnLst>
+        </p:cTn>
       </p:par>
     </p:tnLst>
   </p:timing>
@@ -6923,7 +7219,7 @@
           <a:lstStyle/>
           <a:p>
             <a:pPr lvl="1"/>
-            <a:endParaRPr lang="en-US">
+            <a:endParaRPr lang="en-US" dirty="0">
               <a:ea typeface="+mn-lt"/>
               <a:cs typeface="+mn-lt"/>
             </a:endParaRPr>
@@ -6931,13 +7227,13 @@
           <a:p>
             <a:pPr lvl="1"/>
             <a:r>
-              <a:rPr lang="en-US" sz="2400">
+              <a:rPr lang="en-US" sz="2400" dirty="0">
                 <a:ea typeface="+mn-lt"/>
                 <a:cs typeface="+mn-lt"/>
               </a:rPr>
               <a:t> Discussing the goals of the course  </a:t>
             </a:r>
-            <a:endParaRPr lang="en-US" sz="2400"/>
+            <a:endParaRPr lang="en-US" sz="2400" dirty="0"/>
           </a:p>
           <a:p>
             <a:pPr lvl="1"/>
@@ -6949,16 +7245,12 @@
           <a:p>
             <a:pPr lvl="1"/>
             <a:r>
-              <a:rPr lang="en-US" sz="2400">
+              <a:rPr lang="en-US" sz="2400" dirty="0">
                 <a:ea typeface="+mn-lt"/>
                 <a:cs typeface="+mn-lt"/>
               </a:rPr>
               <a:t> Overview &amp; Assign Topics </a:t>
             </a:r>
-            <a:endParaRPr lang="en-US" sz="2400" dirty="0">
-              <a:ea typeface="+mn-lt"/>
-              <a:cs typeface="+mn-lt"/>
-            </a:endParaRPr>
           </a:p>
           <a:p>
             <a:pPr marL="457200" lvl="1" indent="0">
@@ -6972,30 +7264,44 @@
           <a:p>
             <a:pPr lvl="1"/>
             <a:r>
-              <a:rPr lang="en-US" sz="2400">
+              <a:rPr lang="en-US" sz="2400" dirty="0">
                 <a:ea typeface="+mn-lt"/>
                 <a:cs typeface="+mn-lt"/>
               </a:rPr>
               <a:t> Brief Intro to </a:t>
             </a:r>
             <a:r>
-              <a:rPr lang="en-US" sz="2400" err="1">
+              <a:rPr lang="en-US" sz="2400" dirty="0" err="1">
                 <a:ea typeface="+mn-lt"/>
                 <a:cs typeface="+mn-lt"/>
               </a:rPr>
               <a:t>MatLab</a:t>
             </a:r>
             <a:r>
-              <a:rPr lang="en-US" sz="2400">
+              <a:rPr lang="en-US" sz="2400" dirty="0">
                 <a:ea typeface="+mn-lt"/>
                 <a:cs typeface="+mn-lt"/>
               </a:rPr>
-              <a:t> &amp; Git </a:t>
+              <a:t> &amp; </a:t>
+            </a:r>
+            <a:r>
+              <a:rPr lang="en-US" sz="2400" dirty="0" err="1">
+                <a:ea typeface="+mn-lt"/>
+                <a:cs typeface="+mn-lt"/>
+              </a:rPr>
+              <a:t>Git</a:t>
+            </a:r>
+            <a:r>
+              <a:rPr lang="en-US" sz="2400" dirty="0">
+                <a:ea typeface="+mn-lt"/>
+                <a:cs typeface="+mn-lt"/>
+              </a:rPr>
+              <a:t> </a:t>
             </a:r>
           </a:p>
           <a:p>
             <a:pPr lvl="1"/>
-            <a:endParaRPr lang="en-US"/>
+            <a:endParaRPr lang="en-US" dirty="0"/>
           </a:p>
         </p:txBody>
       </p:sp>
@@ -7116,7 +7422,177 @@
   <p:timing>
     <p:tnLst>
       <p:par>
-        <p:cTn id="1" dur="indefinite" restart="never" nodeType="tmRoot"/>
+        <p:cTn id="1" dur="indefinite" restart="never" nodeType="tmRoot">
+          <p:childTnLst>
+            <p:seq concurrent="1" nextAc="seek">
+              <p:cTn id="2" dur="indefinite" nodeType="mainSeq">
+                <p:childTnLst>
+                  <p:par>
+                    <p:cTn id="3" fill="hold">
+                      <p:stCondLst>
+                        <p:cond delay="indefinite"/>
+                      </p:stCondLst>
+                      <p:childTnLst>
+                        <p:par>
+                          <p:cTn id="4" fill="hold">
+                            <p:stCondLst>
+                              <p:cond delay="0"/>
+                            </p:stCondLst>
+                            <p:childTnLst>
+                              <p:par>
+                                <p:cTn id="5" presetID="1" presetClass="entr" presetSubtype="0" fill="hold" nodeType="clickEffect">
+                                  <p:stCondLst>
+                                    <p:cond delay="0"/>
+                                  </p:stCondLst>
+                                  <p:childTnLst>
+                                    <p:set>
+                                      <p:cBhvr>
+                                        <p:cTn id="6" dur="1" fill="hold">
+                                          <p:stCondLst>
+                                            <p:cond delay="0"/>
+                                          </p:stCondLst>
+                                        </p:cTn>
+                                        <p:tgtEl>
+                                          <p:spTgt spid="3">
+                                            <p:txEl>
+                                              <p:pRg st="1" end="1"/>
+                                            </p:txEl>
+                                          </p:spTgt>
+                                        </p:tgtEl>
+                                        <p:attrNameLst>
+                                          <p:attrName>style.visibility</p:attrName>
+                                        </p:attrNameLst>
+                                      </p:cBhvr>
+                                      <p:to>
+                                        <p:strVal val="visible"/>
+                                      </p:to>
+                                    </p:set>
+                                  </p:childTnLst>
+                                </p:cTn>
+                              </p:par>
+                            </p:childTnLst>
+                          </p:cTn>
+                        </p:par>
+                      </p:childTnLst>
+                    </p:cTn>
+                  </p:par>
+                  <p:par>
+                    <p:cTn id="7" fill="hold">
+                      <p:stCondLst>
+                        <p:cond delay="indefinite"/>
+                      </p:stCondLst>
+                      <p:childTnLst>
+                        <p:par>
+                          <p:cTn id="8" fill="hold">
+                            <p:stCondLst>
+                              <p:cond delay="0"/>
+                            </p:stCondLst>
+                            <p:childTnLst>
+                              <p:par>
+                                <p:cTn id="9" presetID="1" presetClass="entr" presetSubtype="0" fill="hold" nodeType="clickEffect">
+                                  <p:stCondLst>
+                                    <p:cond delay="0"/>
+                                  </p:stCondLst>
+                                  <p:childTnLst>
+                                    <p:set>
+                                      <p:cBhvr>
+                                        <p:cTn id="10" dur="1" fill="hold">
+                                          <p:stCondLst>
+                                            <p:cond delay="0"/>
+                                          </p:stCondLst>
+                                        </p:cTn>
+                                        <p:tgtEl>
+                                          <p:spTgt spid="3">
+                                            <p:txEl>
+                                              <p:pRg st="3" end="3"/>
+                                            </p:txEl>
+                                          </p:spTgt>
+                                        </p:tgtEl>
+                                        <p:attrNameLst>
+                                          <p:attrName>style.visibility</p:attrName>
+                                        </p:attrNameLst>
+                                      </p:cBhvr>
+                                      <p:to>
+                                        <p:strVal val="visible"/>
+                                      </p:to>
+                                    </p:set>
+                                  </p:childTnLst>
+                                </p:cTn>
+                              </p:par>
+                            </p:childTnLst>
+                          </p:cTn>
+                        </p:par>
+                      </p:childTnLst>
+                    </p:cTn>
+                  </p:par>
+                  <p:par>
+                    <p:cTn id="11" fill="hold">
+                      <p:stCondLst>
+                        <p:cond delay="indefinite"/>
+                      </p:stCondLst>
+                      <p:childTnLst>
+                        <p:par>
+                          <p:cTn id="12" fill="hold">
+                            <p:stCondLst>
+                              <p:cond delay="0"/>
+                            </p:stCondLst>
+                            <p:childTnLst>
+                              <p:par>
+                                <p:cTn id="13" presetID="1" presetClass="entr" presetSubtype="0" fill="hold" nodeType="clickEffect">
+                                  <p:stCondLst>
+                                    <p:cond delay="0"/>
+                                  </p:stCondLst>
+                                  <p:childTnLst>
+                                    <p:set>
+                                      <p:cBhvr>
+                                        <p:cTn id="14" dur="1" fill="hold">
+                                          <p:stCondLst>
+                                            <p:cond delay="0"/>
+                                          </p:stCondLst>
+                                        </p:cTn>
+                                        <p:tgtEl>
+                                          <p:spTgt spid="3">
+                                            <p:txEl>
+                                              <p:pRg st="5" end="5"/>
+                                            </p:txEl>
+                                          </p:spTgt>
+                                        </p:tgtEl>
+                                        <p:attrNameLst>
+                                          <p:attrName>style.visibility</p:attrName>
+                                        </p:attrNameLst>
+                                      </p:cBhvr>
+                                      <p:to>
+                                        <p:strVal val="visible"/>
+                                      </p:to>
+                                    </p:set>
+                                  </p:childTnLst>
+                                </p:cTn>
+                              </p:par>
+                            </p:childTnLst>
+                          </p:cTn>
+                        </p:par>
+                      </p:childTnLst>
+                    </p:cTn>
+                  </p:par>
+                </p:childTnLst>
+              </p:cTn>
+              <p:prevCondLst>
+                <p:cond evt="onPrev" delay="0">
+                  <p:tgtEl>
+                    <p:sldTgt/>
+                  </p:tgtEl>
+                </p:cond>
+              </p:prevCondLst>
+              <p:nextCondLst>
+                <p:cond evt="onNext" delay="0">
+                  <p:tgtEl>
+                    <p:sldTgt/>
+                  </p:tgtEl>
+                </p:cond>
+              </p:nextCondLst>
+            </p:seq>
+          </p:childTnLst>
+        </p:cTn>
       </p:par>
     </p:tnLst>
   </p:timing>
@@ -7848,7 +8324,7 @@
         </p:nvSpPr>
         <p:spPr>
           <a:xfrm>
-            <a:off x="808274" y="2483246"/>
+            <a:off x="810000" y="2314282"/>
             <a:ext cx="10554574" cy="4335880"/>
           </a:xfrm>
         </p:spPr>
@@ -7933,14 +8409,6 @@
               <a:rPr lang="en-US" dirty="0"/>
               <a:t>You don't need to be an expert! </a:t>
             </a:r>
-          </a:p>
-          <a:p>
-            <a:pPr lvl="1" indent="0"/>
-            <a:endParaRPr lang="en-US" dirty="0"/>
-          </a:p>
-          <a:p>
-            <a:pPr lvl="1" indent="0"/>
-            <a:endParaRPr lang="en-US" dirty="0"/>
           </a:p>
           <a:p>
             <a:pPr lvl="1" indent="0"/>

</xml_diff>

<commit_message>
Adding homework data and code.
</commit_message>
<xml_diff>
--- a/Presentations/Week_1_Introduction/BCS Stats Week 1 INTRO.pptx
+++ b/Presentations/Week_1_Introduction/BCS Stats Week 1 INTRO.pptx
@@ -226,7 +226,7 @@
           <a:effectLst/>
           <a:extLst>
             <a:ext uri="{91240B29-F687-4f45-9708-019B960494DF}">
-              <a14:hiddenLine xmlns:a14="http://schemas.microsoft.com/office/drawing/2010/main" xmlns="" w="9525">
+              <a14:hiddenLine xmlns="" xmlns:a14="http://schemas.microsoft.com/office/drawing/2010/main" w="9525">
                 <a:solidFill>
                   <a:srgbClr val="000000"/>
                 </a:solidFill>
@@ -417,7 +417,7 @@
             <a:fld id="{08B9EBBA-996F-894A-B54A-D6246ED52CEA}" type="datetimeFigureOut">
               <a:rPr lang="en-US" dirty="0"/>
               <a:pPr/>
-              <a:t>8/24/2020</a:t>
+              <a:t>8/27/2020</a:t>
             </a:fld>
             <a:endParaRPr lang="en-US" dirty="0"/>
           </a:p>
@@ -732,7 +732,7 @@
             <a:fld id="{18C79C5D-2A6F-F04D-97DA-BEF2467B64E4}" type="datetimeFigureOut">
               <a:rPr lang="en-US" dirty="0"/>
               <a:pPr/>
-              <a:t>8/24/2020</a:t>
+              <a:t>8/27/2020</a:t>
             </a:fld>
             <a:endParaRPr lang="en-US" dirty="0"/>
           </a:p>
@@ -1221,7 +1221,7 @@
             <a:fld id="{8DFA1846-DA80-1C48-A609-854EA85C59AD}" type="datetimeFigureOut">
               <a:rPr lang="en-US" dirty="0"/>
               <a:pPr/>
-              <a:t>8/24/2020</a:t>
+              <a:t>8/27/2020</a:t>
             </a:fld>
             <a:endParaRPr lang="en-US" dirty="0"/>
           </a:p>
@@ -1591,7 +1591,7 @@
             <a:fld id="{FBF54567-0DE4-3F47-BF90-CB84690072F9}" type="datetimeFigureOut">
               <a:rPr lang="en-US" dirty="0"/>
               <a:pPr/>
-              <a:t>8/24/2020</a:t>
+              <a:t>8/27/2020</a:t>
             </a:fld>
             <a:endParaRPr lang="en-US" dirty="0"/>
           </a:p>
@@ -1747,7 +1747,7 @@
           <a:ln/>
           <a:extLst>
             <a:ext uri="{91240B29-F687-4f45-9708-019B960494DF}">
-              <a14:hiddenLine xmlns:a14="http://schemas.microsoft.com/office/drawing/2010/main" xmlns="" w="9525">
+              <a14:hiddenLine xmlns="" xmlns:a14="http://schemas.microsoft.com/office/drawing/2010/main" w="9525">
                 <a:solidFill>
                   <a:srgbClr val="000000"/>
                 </a:solidFill>
@@ -1864,7 +1864,7 @@
             <a:fld id="{C6C52C72-DE31-F449-A4ED-4C594FD91407}" type="datetimeFigureOut">
               <a:rPr lang="en-US" dirty="0"/>
               <a:pPr/>
-              <a:t>8/24/2020</a:t>
+              <a:t>8/27/2020</a:t>
             </a:fld>
             <a:endParaRPr lang="en-US" dirty="0"/>
           </a:p>
@@ -2022,7 +2022,7 @@
           <a:ln/>
           <a:extLst>
             <a:ext uri="{91240B29-F687-4f45-9708-019B960494DF}">
-              <a14:hiddenLine xmlns:a14="http://schemas.microsoft.com/office/drawing/2010/main" xmlns="" w="9525">
+              <a14:hiddenLine xmlns="" xmlns:a14="http://schemas.microsoft.com/office/drawing/2010/main" w="9525">
                 <a:solidFill>
                   <a:srgbClr val="000000"/>
                 </a:solidFill>
@@ -2149,7 +2149,7 @@
             <a:fld id="{ED62726E-379B-B349-9EED-81ED093FA806}" type="datetimeFigureOut">
               <a:rPr lang="en-US" dirty="0"/>
               <a:pPr/>
-              <a:t>8/24/2020</a:t>
+              <a:t>8/27/2020</a:t>
             </a:fld>
             <a:endParaRPr lang="en-US" dirty="0"/>
           </a:p>
@@ -2305,7 +2305,7 @@
           <a:ln/>
           <a:extLst>
             <a:ext uri="{91240B29-F687-4f45-9708-019B960494DF}">
-              <a14:hiddenLine xmlns:a14="http://schemas.microsoft.com/office/drawing/2010/main" xmlns="" w="9525">
+              <a14:hiddenLine xmlns="" xmlns:a14="http://schemas.microsoft.com/office/drawing/2010/main" w="9525">
                 <a:solidFill>
                   <a:srgbClr val="000000"/>
                 </a:solidFill>
@@ -2432,7 +2432,7 @@
             <a:fld id="{9B3A1323-8D79-1946-B0D7-40001CF92E9D}" type="datetimeFigureOut">
               <a:rPr lang="en-US" dirty="0"/>
               <a:pPr/>
-              <a:t>8/24/2020</a:t>
+              <a:t>8/27/2020</a:t>
             </a:fld>
             <a:endParaRPr lang="en-US" dirty="0"/>
           </a:p>
@@ -2776,7 +2776,7 @@
             <a:fld id="{8DFA1846-DA80-1C48-A609-854EA85C59AD}" type="datetimeFigureOut">
               <a:rPr lang="en-US" dirty="0"/>
               <a:pPr/>
-              <a:t>8/24/2020</a:t>
+              <a:t>8/27/2020</a:t>
             </a:fld>
             <a:endParaRPr lang="en-US" dirty="0"/>
           </a:p>
@@ -2932,7 +2932,7 @@
           <a:ln/>
           <a:extLst>
             <a:ext uri="{91240B29-F687-4f45-9708-019B960494DF}">
-              <a14:hiddenLine xmlns:a14="http://schemas.microsoft.com/office/drawing/2010/main" xmlns="" w="9525">
+              <a14:hiddenLine xmlns="" xmlns:a14="http://schemas.microsoft.com/office/drawing/2010/main" w="9525">
                 <a:solidFill>
                   <a:srgbClr val="000000"/>
                 </a:solidFill>
@@ -3114,7 +3114,7 @@
             <a:fld id="{57302355-E14B-8545-A8F8-0FE83CC9D524}" type="datetimeFigureOut">
               <a:rPr lang="en-US" dirty="0"/>
               <a:pPr/>
-              <a:t>8/24/2020</a:t>
+              <a:t>8/27/2020</a:t>
             </a:fld>
             <a:endParaRPr lang="en-US" dirty="0"/>
           </a:p>
@@ -3270,7 +3270,7 @@
           <a:ln/>
           <a:extLst>
             <a:ext uri="{91240B29-F687-4f45-9708-019B960494DF}">
-              <a14:hiddenLine xmlns:a14="http://schemas.microsoft.com/office/drawing/2010/main" xmlns="" w="9525">
+              <a14:hiddenLine xmlns="" xmlns:a14="http://schemas.microsoft.com/office/drawing/2010/main" w="9525">
                 <a:solidFill>
                   <a:srgbClr val="000000"/>
                 </a:solidFill>
@@ -3590,7 +3590,7 @@
             <a:fld id="{02640F58-564D-2B4F-AE67-E407BA4FCF45}" type="datetimeFigureOut">
               <a:rPr lang="en-US" dirty="0"/>
               <a:pPr/>
-              <a:t>8/24/2020</a:t>
+              <a:t>8/27/2020</a:t>
             </a:fld>
             <a:endParaRPr lang="en-US" dirty="0"/>
           </a:p>
@@ -3746,7 +3746,7 @@
           <a:ln/>
           <a:extLst>
             <a:ext uri="{91240B29-F687-4f45-9708-019B960494DF}">
-              <a14:hiddenLine xmlns:a14="http://schemas.microsoft.com/office/drawing/2010/main" xmlns="" w="9525">
+              <a14:hiddenLine xmlns="" xmlns:a14="http://schemas.microsoft.com/office/drawing/2010/main" w="9525">
                 <a:solidFill>
                   <a:srgbClr val="000000"/>
                 </a:solidFill>
@@ -3812,7 +3812,7 @@
             <a:fld id="{F13A34C8-038E-2045-AF43-DF7DBB8E0E9E}" type="datetimeFigureOut">
               <a:rPr lang="en-US" dirty="0"/>
               <a:pPr/>
-              <a:t>8/24/2020</a:t>
+              <a:t>8/27/2020</a:t>
             </a:fld>
             <a:endParaRPr lang="en-US" dirty="0"/>
           </a:p>
@@ -3909,7 +3909,7 @@
             <a:fld id="{8818C68F-D26B-8F47-958C-23B49CF8A634}" type="datetimeFigureOut">
               <a:rPr lang="en-US" dirty="0"/>
               <a:pPr/>
-              <a:t>8/24/2020</a:t>
+              <a:t>8/27/2020</a:t>
             </a:fld>
             <a:endParaRPr lang="en-US" dirty="0"/>
           </a:p>
@@ -4178,7 +4178,7 @@
           <a:ln/>
           <a:extLst>
             <a:ext uri="{91240B29-F687-4f45-9708-019B960494DF}">
-              <a14:hiddenLine xmlns:a14="http://schemas.microsoft.com/office/drawing/2010/main" xmlns="" w="9525">
+              <a14:hiddenLine xmlns="" xmlns:a14="http://schemas.microsoft.com/office/drawing/2010/main" w="9525">
                 <a:solidFill>
                   <a:srgbClr val="000000"/>
                 </a:solidFill>
@@ -4376,7 +4376,7 @@
             <a:fld id="{D0DF5E60-9974-AC48-9591-99C2BB44B7CF}" type="datetimeFigureOut">
               <a:rPr lang="en-US" dirty="0"/>
               <a:pPr/>
-              <a:t>8/24/2020</a:t>
+              <a:t>8/27/2020</a:t>
             </a:fld>
             <a:endParaRPr lang="en-US" dirty="0"/>
           </a:p>
@@ -4686,7 +4686,7 @@
             <a:fld id="{18C79C5D-2A6F-F04D-97DA-BEF2467B64E4}" type="datetimeFigureOut">
               <a:rPr lang="en-US" dirty="0"/>
               <a:pPr/>
-              <a:t>8/24/2020</a:t>
+              <a:t>8/27/2020</a:t>
             </a:fld>
             <a:endParaRPr lang="en-US" dirty="0"/>
           </a:p>
@@ -4956,7 +4956,7 @@
             <a:fld id="{09B482E8-6E0E-1B4F-B1FD-C69DB9E858D9}" type="datetimeFigureOut">
               <a:rPr lang="en-US" dirty="0"/>
               <a:pPr/>
-              <a:t>8/24/2020</a:t>
+              <a:t>8/27/2020</a:t>
             </a:fld>
             <a:endParaRPr lang="en-US" dirty="0"/>
           </a:p>
@@ -5423,7 +5423,7 @@
                 <a16:creationId xmlns:a16="http://schemas.microsoft.com/office/drawing/2014/main" id="{12839A1C-34CB-4C3C-8531-CA67525FDE9E}"/>
               </a:ext>
               <a:ext uri="{C183D7F6-B498-43B3-948B-1728B52AA6E4}">
-                <adec:decorative xmlns:adec="http://schemas.microsoft.com/office/drawing/2017/decorative" xmlns="" val="1"/>
+                <adec:decorative xmlns="" xmlns:adec="http://schemas.microsoft.com/office/drawing/2017/decorative" val="1"/>
               </a:ext>
             </a:extLst>
           </p:cNvPr>
@@ -5555,7 +5555,7 @@
                 <a16:creationId xmlns:a16="http://schemas.microsoft.com/office/drawing/2014/main" id="{FAC94EAF-F7F7-4727-AE69-A7036B4A5122}"/>
               </a:ext>
               <a:ext uri="{C183D7F6-B498-43B3-948B-1728B52AA6E4}">
-                <adec:decorative xmlns:adec="http://schemas.microsoft.com/office/drawing/2017/decorative" xmlns="" val="1"/>
+                <adec:decorative xmlns="" xmlns:adec="http://schemas.microsoft.com/office/drawing/2017/decorative" val="1"/>
               </a:ext>
             </a:extLst>
           </p:cNvPr>
@@ -5760,7 +5760,7 @@
           <a:effectLst/>
           <a:extLst>
             <a:ext uri="{91240B29-F687-4f45-9708-019B960494DF}">
-              <a14:hiddenLine xmlns:a16="http://schemas.microsoft.com/office/drawing/2014/main" xmlns:p14="http://schemas.microsoft.com/office/powerpoint/2010/main" xmlns:a14="http://schemas.microsoft.com/office/drawing/2010/main" xmlns="" w="9525">
+              <a14:hiddenLine xmlns="" xmlns:a14="http://schemas.microsoft.com/office/drawing/2010/main" xmlns:p14="http://schemas.microsoft.com/office/powerpoint/2010/main" xmlns:a16="http://schemas.microsoft.com/office/drawing/2014/main" w="9525">
                 <a:solidFill>
                   <a:srgbClr val="000000"/>
                 </a:solidFill>
@@ -6176,7 +6176,7 @@
                 <a16:creationId xmlns:a16="http://schemas.microsoft.com/office/drawing/2014/main" id="{089A69AF-D57B-49B4-886C-D4A5DC194421}"/>
               </a:ext>
               <a:ext uri="{C183D7F6-B498-43B3-948B-1728B52AA6E4}">
-                <adec:decorative xmlns:adec="http://schemas.microsoft.com/office/drawing/2017/decorative" xmlns="" val="1"/>
+                <adec:decorative xmlns="" xmlns:adec="http://schemas.microsoft.com/office/drawing/2017/decorative" val="1"/>
               </a:ext>
             </a:extLst>
           </p:cNvPr>
@@ -6236,7 +6236,7 @@
                 <a16:creationId xmlns:a16="http://schemas.microsoft.com/office/drawing/2014/main" id="{CABDC08D-6093-4397-92D4-54D00E2BB1C2}"/>
               </a:ext>
               <a:ext uri="{C183D7F6-B498-43B3-948B-1728B52AA6E4}">
-                <adec:decorative xmlns:adec="http://schemas.microsoft.com/office/drawing/2017/decorative" xmlns="" val="1"/>
+                <adec:decorative xmlns="" xmlns:adec="http://schemas.microsoft.com/office/drawing/2017/decorative" val="1"/>
               </a:ext>
             </a:extLst>
           </p:cNvPr>
@@ -6441,7 +6441,7 @@
           <a:effectLst/>
           <a:extLst>
             <a:ext uri="{91240B29-F687-4f45-9708-019B960494DF}">
-              <a14:hiddenLine xmlns:a14="http://schemas.microsoft.com/office/drawing/2010/main" xmlns:p14="http://schemas.microsoft.com/office/powerpoint/2010/main" xmlns:a16="http://schemas.microsoft.com/office/drawing/2014/main" xmlns="" w="9525">
+              <a14:hiddenLine xmlns="" xmlns:a16="http://schemas.microsoft.com/office/drawing/2014/main" xmlns:p14="http://schemas.microsoft.com/office/powerpoint/2010/main" xmlns:a14="http://schemas.microsoft.com/office/drawing/2010/main" w="9525">
                 <a:solidFill>
                   <a:srgbClr val="000000"/>
                 </a:solidFill>
@@ -6601,11 +6601,7 @@
             </a:r>
             <a:r>
               <a:rPr lang="en-US" sz="2000" dirty="0" smtClean="0"/>
-              <a:t>. </a:t>
-            </a:r>
-            <a:r>
-              <a:rPr lang="en-US" sz="2000" dirty="0" smtClean="0"/>
-              <a:t>(maybe a little R)</a:t>
+              <a:t>. (maybe a little R)</a:t>
             </a:r>
             <a:endParaRPr lang="en-US" sz="2000" dirty="0"/>
           </a:p>
@@ -6871,7 +6867,7 @@
                 <a16:creationId xmlns:a16="http://schemas.microsoft.com/office/drawing/2014/main" id="{E704FB0A-3918-43DC-83E9-600217A87145}"/>
               </a:ext>
               <a:ext uri="{C183D7F6-B498-43B3-948B-1728B52AA6E4}">
-                <adec:decorative xmlns:adec="http://schemas.microsoft.com/office/drawing/2017/decorative" xmlns="" val="1"/>
+                <adec:decorative xmlns="" xmlns:adec="http://schemas.microsoft.com/office/drawing/2017/decorative" val="1"/>
               </a:ext>
             </a:extLst>
           </p:cNvPr>
@@ -6934,7 +6930,7 @@
                 <a16:creationId xmlns:a16="http://schemas.microsoft.com/office/drawing/2014/main" id="{1D1DF376-FCFE-4FC3-A377-79806F9885D0}"/>
               </a:ext>
               <a:ext uri="{C183D7F6-B498-43B3-948B-1728B52AA6E4}">
-                <adec:decorative xmlns:adec="http://schemas.microsoft.com/office/drawing/2017/decorative" xmlns="" val="1"/>
+                <adec:decorative xmlns="" xmlns:adec="http://schemas.microsoft.com/office/drawing/2017/decorative" val="1"/>
               </a:ext>
             </a:extLst>
           </p:cNvPr>
@@ -7313,7 +7309,7 @@
                 <a16:creationId xmlns:a16="http://schemas.microsoft.com/office/drawing/2014/main" id="{6C12B9F6-7F8D-48DD-97E3-EE3587AB960E}"/>
               </a:ext>
               <a:ext uri="{C183D7F6-B498-43B3-948B-1728B52AA6E4}">
-                <adec:decorative xmlns:adec="http://schemas.microsoft.com/office/drawing/2017/decorative" xmlns="" val="1"/>
+                <adec:decorative xmlns="" xmlns:adec="http://schemas.microsoft.com/office/drawing/2017/decorative" val="1"/>
               </a:ext>
             </a:extLst>
           </p:cNvPr>
@@ -7391,7 +7387,7 @@
           <a:blip r:embed="rId2">
             <a:extLst>
               <a:ext uri="{96DAC541-7B7A-43D3-8B79-37D633B846F1}">
-                <asvg:svgBlip xmlns:asvg="http://schemas.microsoft.com/office/drawing/2016/SVG/main" xmlns="" r:embed="rId3"/>
+                <asvg:svgBlip xmlns="" xmlns:asvg="http://schemas.microsoft.com/office/drawing/2016/SVG/main" r:embed="rId3"/>
               </a:ext>
             </a:extLst>
           </a:blip>

</xml_diff>